<commit_message>
[DOC] Modify PPT cover
</commit_message>
<xml_diff>
--- a/HomeWork_1/DOC/PPT/PPT.pptx
+++ b/HomeWork_1/DOC/PPT/PPT.pptx
@@ -302,7 +302,8 @@
           <a:p>
             <a:fld id="{3A81A459-E776-7B40-AAC7-C31A505C27D3}" type="datetimeFigureOut">
               <a:rPr kumimoji="1" lang="zh-TW" altLang="en-US" smtClean="0"/>
-              <a:t>15/4/28</a:t>
+              <a:pPr/>
+              <a:t>2015/4/28</a:t>
             </a:fld>
             <a:endParaRPr kumimoji="1" lang="zh-TW" altLang="en-US"/>
           </a:p>
@@ -344,6 +345,7 @@
           <a:p>
             <a:fld id="{6961F1FA-B045-614A-A92D-1C6358E7981E}" type="slidenum">
               <a:rPr kumimoji="1" lang="zh-TW" altLang="en-US" smtClean="0"/>
+              <a:pPr/>
               <a:t>‹#›</a:t>
             </a:fld>
             <a:endParaRPr kumimoji="1" lang="zh-TW" altLang="en-US"/>
@@ -467,7 +469,8 @@
           <a:p>
             <a:fld id="{3A81A459-E776-7B40-AAC7-C31A505C27D3}" type="datetimeFigureOut">
               <a:rPr kumimoji="1" lang="zh-TW" altLang="en-US" smtClean="0"/>
-              <a:t>15/4/28</a:t>
+              <a:pPr/>
+              <a:t>2015/4/28</a:t>
             </a:fld>
             <a:endParaRPr kumimoji="1" lang="zh-TW" altLang="en-US"/>
           </a:p>
@@ -509,6 +512,7 @@
           <a:p>
             <a:fld id="{6961F1FA-B045-614A-A92D-1C6358E7981E}" type="slidenum">
               <a:rPr kumimoji="1" lang="zh-TW" altLang="en-US" smtClean="0"/>
+              <a:pPr/>
               <a:t>‹#›</a:t>
             </a:fld>
             <a:endParaRPr kumimoji="1" lang="zh-TW" altLang="en-US"/>
@@ -642,7 +646,8 @@
           <a:p>
             <a:fld id="{3A81A459-E776-7B40-AAC7-C31A505C27D3}" type="datetimeFigureOut">
               <a:rPr kumimoji="1" lang="zh-TW" altLang="en-US" smtClean="0"/>
-              <a:t>15/4/28</a:t>
+              <a:pPr/>
+              <a:t>2015/4/28</a:t>
             </a:fld>
             <a:endParaRPr kumimoji="1" lang="zh-TW" altLang="en-US"/>
           </a:p>
@@ -684,6 +689,7 @@
           <a:p>
             <a:fld id="{6961F1FA-B045-614A-A92D-1C6358E7981E}" type="slidenum">
               <a:rPr kumimoji="1" lang="zh-TW" altLang="en-US" smtClean="0"/>
+              <a:pPr/>
               <a:t>‹#›</a:t>
             </a:fld>
             <a:endParaRPr kumimoji="1" lang="zh-TW" altLang="en-US"/>
@@ -807,7 +813,8 @@
           <a:p>
             <a:fld id="{3A81A459-E776-7B40-AAC7-C31A505C27D3}" type="datetimeFigureOut">
               <a:rPr kumimoji="1" lang="zh-TW" altLang="en-US" smtClean="0"/>
-              <a:t>15/4/28</a:t>
+              <a:pPr/>
+              <a:t>2015/4/28</a:t>
             </a:fld>
             <a:endParaRPr kumimoji="1" lang="zh-TW" altLang="en-US"/>
           </a:p>
@@ -849,6 +856,7 @@
           <a:p>
             <a:fld id="{6961F1FA-B045-614A-A92D-1C6358E7981E}" type="slidenum">
               <a:rPr kumimoji="1" lang="zh-TW" altLang="en-US" smtClean="0"/>
+              <a:pPr/>
               <a:t>‹#›</a:t>
             </a:fld>
             <a:endParaRPr kumimoji="1" lang="zh-TW" altLang="en-US"/>
@@ -1048,7 +1056,8 @@
           <a:p>
             <a:fld id="{3A81A459-E776-7B40-AAC7-C31A505C27D3}" type="datetimeFigureOut">
               <a:rPr kumimoji="1" lang="zh-TW" altLang="en-US" smtClean="0"/>
-              <a:t>15/4/28</a:t>
+              <a:pPr/>
+              <a:t>2015/4/28</a:t>
             </a:fld>
             <a:endParaRPr kumimoji="1" lang="zh-TW" altLang="en-US"/>
           </a:p>
@@ -1090,6 +1099,7 @@
           <a:p>
             <a:fld id="{6961F1FA-B045-614A-A92D-1C6358E7981E}" type="slidenum">
               <a:rPr kumimoji="1" lang="zh-TW" altLang="en-US" smtClean="0"/>
+              <a:pPr/>
               <a:t>‹#›</a:t>
             </a:fld>
             <a:endParaRPr kumimoji="1" lang="zh-TW" altLang="en-US"/>
@@ -1331,7 +1341,8 @@
           <a:p>
             <a:fld id="{3A81A459-E776-7B40-AAC7-C31A505C27D3}" type="datetimeFigureOut">
               <a:rPr kumimoji="1" lang="zh-TW" altLang="en-US" smtClean="0"/>
-              <a:t>15/4/28</a:t>
+              <a:pPr/>
+              <a:t>2015/4/28</a:t>
             </a:fld>
             <a:endParaRPr kumimoji="1" lang="zh-TW" altLang="en-US"/>
           </a:p>
@@ -1373,6 +1384,7 @@
           <a:p>
             <a:fld id="{6961F1FA-B045-614A-A92D-1C6358E7981E}" type="slidenum">
               <a:rPr kumimoji="1" lang="zh-TW" altLang="en-US" smtClean="0"/>
+              <a:pPr/>
               <a:t>‹#›</a:t>
             </a:fld>
             <a:endParaRPr kumimoji="1" lang="zh-TW" altLang="en-US"/>
@@ -1760,7 +1772,8 @@
           <a:p>
             <a:fld id="{3A81A459-E776-7B40-AAC7-C31A505C27D3}" type="datetimeFigureOut">
               <a:rPr kumimoji="1" lang="zh-TW" altLang="en-US" smtClean="0"/>
-              <a:t>15/4/28</a:t>
+              <a:pPr/>
+              <a:t>2015/4/28</a:t>
             </a:fld>
             <a:endParaRPr kumimoji="1" lang="zh-TW" altLang="en-US"/>
           </a:p>
@@ -1802,6 +1815,7 @@
           <a:p>
             <a:fld id="{6961F1FA-B045-614A-A92D-1C6358E7981E}" type="slidenum">
               <a:rPr kumimoji="1" lang="zh-TW" altLang="en-US" smtClean="0"/>
+              <a:pPr/>
               <a:t>‹#›</a:t>
             </a:fld>
             <a:endParaRPr kumimoji="1" lang="zh-TW" altLang="en-US"/>
@@ -1873,7 +1887,8 @@
           <a:p>
             <a:fld id="{3A81A459-E776-7B40-AAC7-C31A505C27D3}" type="datetimeFigureOut">
               <a:rPr kumimoji="1" lang="zh-TW" altLang="en-US" smtClean="0"/>
-              <a:t>15/4/28</a:t>
+              <a:pPr/>
+              <a:t>2015/4/28</a:t>
             </a:fld>
             <a:endParaRPr kumimoji="1" lang="zh-TW" altLang="en-US"/>
           </a:p>
@@ -1915,6 +1930,7 @@
           <a:p>
             <a:fld id="{6961F1FA-B045-614A-A92D-1C6358E7981E}" type="slidenum">
               <a:rPr kumimoji="1" lang="zh-TW" altLang="en-US" smtClean="0"/>
+              <a:pPr/>
               <a:t>‹#›</a:t>
             </a:fld>
             <a:endParaRPr kumimoji="1" lang="zh-TW" altLang="en-US"/>
@@ -1963,7 +1979,8 @@
           <a:p>
             <a:fld id="{3A81A459-E776-7B40-AAC7-C31A505C27D3}" type="datetimeFigureOut">
               <a:rPr kumimoji="1" lang="zh-TW" altLang="en-US" smtClean="0"/>
-              <a:t>15/4/28</a:t>
+              <a:pPr/>
+              <a:t>2015/4/28</a:t>
             </a:fld>
             <a:endParaRPr kumimoji="1" lang="zh-TW" altLang="en-US"/>
           </a:p>
@@ -2005,6 +2022,7 @@
           <a:p>
             <a:fld id="{6961F1FA-B045-614A-A92D-1C6358E7981E}" type="slidenum">
               <a:rPr kumimoji="1" lang="zh-TW" altLang="en-US" smtClean="0"/>
+              <a:pPr/>
               <a:t>‹#›</a:t>
             </a:fld>
             <a:endParaRPr kumimoji="1" lang="zh-TW" altLang="en-US"/>
@@ -2152,7 +2170,8 @@
           <a:p>
             <a:fld id="{3A81A459-E776-7B40-AAC7-C31A505C27D3}" type="datetimeFigureOut">
               <a:rPr kumimoji="1" lang="zh-TW" altLang="en-US" smtClean="0"/>
-              <a:t>15/4/28</a:t>
+              <a:pPr/>
+              <a:t>2015/4/28</a:t>
             </a:fld>
             <a:endParaRPr kumimoji="1" lang="zh-TW" altLang="en-US"/>
           </a:p>
@@ -2194,6 +2213,7 @@
           <a:p>
             <a:fld id="{6961F1FA-B045-614A-A92D-1C6358E7981E}" type="slidenum">
               <a:rPr kumimoji="1" lang="zh-TW" altLang="en-US" smtClean="0"/>
+              <a:pPr/>
               <a:t>‹#›</a:t>
             </a:fld>
             <a:endParaRPr kumimoji="1" lang="zh-TW" altLang="en-US"/>
@@ -2470,7 +2490,8 @@
           <a:p>
             <a:fld id="{3A81A459-E776-7B40-AAC7-C31A505C27D3}" type="datetimeFigureOut">
               <a:rPr kumimoji="1" lang="zh-TW" altLang="en-US" smtClean="0"/>
-              <a:t>15/4/28</a:t>
+              <a:pPr/>
+              <a:t>2015/4/28</a:t>
             </a:fld>
             <a:endParaRPr kumimoji="1" lang="zh-TW" altLang="en-US"/>
           </a:p>
@@ -2493,6 +2514,7 @@
           <a:p>
             <a:fld id="{6961F1FA-B045-614A-A92D-1C6358E7981E}" type="slidenum">
               <a:rPr kumimoji="1" lang="zh-TW" altLang="en-US" smtClean="0"/>
+              <a:pPr/>
               <a:t>‹#›</a:t>
             </a:fld>
             <a:endParaRPr kumimoji="1" lang="zh-TW" altLang="en-US"/>
@@ -2775,6 +2797,7 @@
           <a:p>
             <a:fld id="{6961F1FA-B045-614A-A92D-1C6358E7981E}" type="slidenum">
               <a:rPr kumimoji="1" lang="zh-TW" altLang="en-US" smtClean="0"/>
+              <a:pPr/>
               <a:t>‹#›</a:t>
             </a:fld>
             <a:endParaRPr kumimoji="1" lang="zh-TW" altLang="en-US"/>
@@ -2849,7 +2872,8 @@
           <a:p>
             <a:fld id="{3A81A459-E776-7B40-AAC7-C31A505C27D3}" type="datetimeFigureOut">
               <a:rPr kumimoji="1" lang="zh-TW" altLang="en-US" smtClean="0"/>
-              <a:t>15/4/28</a:t>
+              <a:pPr/>
+              <a:t>2015/4/28</a:t>
             </a:fld>
             <a:endParaRPr kumimoji="1" lang="zh-TW" altLang="en-US"/>
           </a:p>
@@ -3201,7 +3225,7 @@
             </a:r>
             <a:r>
               <a:rPr kumimoji="1" lang="en-US" altLang="zh-TW" dirty="0" smtClean="0"/>
-              <a:t>Data</a:t>
+              <a:t>Data Analytics – Homework 1</a:t>
             </a:r>
             <a:endParaRPr kumimoji="1" lang="zh-TW" altLang="en-US" dirty="0"/>
           </a:p>
@@ -3230,31 +3254,31 @@
           <a:lstStyle/>
           <a:p>
             <a:r>
-              <a:rPr lang="zh-CHT" altLang="en-US" dirty="0"/>
+              <a:rPr lang="zh-Hant" altLang="en-US" dirty="0"/>
               <a:t>游春傑</a:t>
             </a:r>
             <a:r>
-              <a:rPr lang="en-US" altLang="zh-CHT" dirty="0"/>
+              <a:rPr lang="en-US" altLang="zh-Hant" dirty="0"/>
               <a:t>:D10315001</a:t>
             </a:r>
           </a:p>
           <a:p>
             <a:r>
-              <a:rPr lang="zh-CHT" altLang="en-US" dirty="0"/>
+              <a:rPr lang="zh-Hant" altLang="en-US" dirty="0"/>
               <a:t>薛聿明</a:t>
             </a:r>
             <a:r>
-              <a:rPr lang="en-US" altLang="zh-CHT" dirty="0"/>
+              <a:rPr lang="en-US" altLang="zh-Hant" dirty="0"/>
               <a:t>:D10307009</a:t>
             </a:r>
           </a:p>
           <a:p>
             <a:r>
-              <a:rPr lang="zh-CHT" altLang="en-US" dirty="0"/>
+              <a:rPr lang="zh-Hant" altLang="en-US" dirty="0"/>
               <a:t>楊承翰</a:t>
             </a:r>
             <a:r>
-              <a:rPr lang="en-US" altLang="zh-CHT" dirty="0"/>
+              <a:rPr lang="en-US" altLang="zh-Hant" dirty="0"/>
               <a:t>:M10209106</a:t>
             </a:r>
           </a:p>
@@ -3270,11 +3294,11 @@
           </a:p>
           <a:p>
             <a:r>
-              <a:rPr lang="zh-CHT" altLang="en-US" dirty="0"/>
+              <a:rPr lang="zh-Hant" altLang="en-US" dirty="0"/>
               <a:t>吳致芳</a:t>
             </a:r>
             <a:r>
-              <a:rPr lang="en-US" altLang="zh-CHT" dirty="0"/>
+              <a:rPr lang="en-US" altLang="zh-Hant" dirty="0"/>
               <a:t>:M10309103</a:t>
             </a:r>
             <a:endParaRPr kumimoji="1" lang="zh-TW" altLang="en-US" dirty="0"/>
@@ -3284,7 +3308,7 @@
     </p:spTree>
     <p:extLst>
       <p:ext uri="{BB962C8B-B14F-4D97-AF65-F5344CB8AC3E}">
-        <p14:creationId xmlns:p14="http://schemas.microsoft.com/office/powerpoint/2010/main" val="1859202101"/>
+        <p14:creationId xmlns:p14="http://schemas.microsoft.com/office/powerpoint/2010/main" xmlns="" val="1859202101"/>
       </p:ext>
     </p:extLst>
   </p:cSld>
@@ -3352,7 +3376,7 @@
     </p:spTree>
     <p:extLst>
       <p:ext uri="{BB962C8B-B14F-4D97-AF65-F5344CB8AC3E}">
-        <p14:creationId xmlns:p14="http://schemas.microsoft.com/office/powerpoint/2010/main" val="3299767040"/>
+        <p14:creationId xmlns:p14="http://schemas.microsoft.com/office/powerpoint/2010/main" xmlns="" val="3299767040"/>
       </p:ext>
     </p:extLst>
   </p:cSld>

</xml_diff>